<commit_message>
Dag and helm chart for deploymnet
</commit_message>
<xml_diff>
--- a/final_project_presentation.pptx
+++ b/final_project_presentation.pptx
@@ -245,7 +245,7 @@
           <a:p>
             <a:fld id="{380BABED-8104-4418-89E4-07524A11A7A5}" type="datetimeFigureOut">
               <a:rPr lang="ru-RU" smtClean="0"/>
-              <a:t>24.08.2024</a:t>
+              <a:t>25.08.2024</a:t>
             </a:fld>
             <a:endParaRPr lang="ru-RU"/>
           </a:p>
@@ -415,7 +415,7 @@
           <a:p>
             <a:fld id="{380BABED-8104-4418-89E4-07524A11A7A5}" type="datetimeFigureOut">
               <a:rPr lang="ru-RU" smtClean="0"/>
-              <a:t>24.08.2024</a:t>
+              <a:t>25.08.2024</a:t>
             </a:fld>
             <a:endParaRPr lang="ru-RU"/>
           </a:p>
@@ -595,7 +595,7 @@
           <a:p>
             <a:fld id="{380BABED-8104-4418-89E4-07524A11A7A5}" type="datetimeFigureOut">
               <a:rPr lang="ru-RU" smtClean="0"/>
-              <a:t>24.08.2024</a:t>
+              <a:t>25.08.2024</a:t>
             </a:fld>
             <a:endParaRPr lang="ru-RU"/>
           </a:p>
@@ -765,7 +765,7 @@
           <a:p>
             <a:fld id="{380BABED-8104-4418-89E4-07524A11A7A5}" type="datetimeFigureOut">
               <a:rPr lang="ru-RU" smtClean="0"/>
-              <a:t>24.08.2024</a:t>
+              <a:t>25.08.2024</a:t>
             </a:fld>
             <a:endParaRPr lang="ru-RU"/>
           </a:p>
@@ -1011,7 +1011,7 @@
           <a:p>
             <a:fld id="{380BABED-8104-4418-89E4-07524A11A7A5}" type="datetimeFigureOut">
               <a:rPr lang="ru-RU" smtClean="0"/>
-              <a:t>24.08.2024</a:t>
+              <a:t>25.08.2024</a:t>
             </a:fld>
             <a:endParaRPr lang="ru-RU"/>
           </a:p>
@@ -1243,7 +1243,7 @@
           <a:p>
             <a:fld id="{380BABED-8104-4418-89E4-07524A11A7A5}" type="datetimeFigureOut">
               <a:rPr lang="ru-RU" smtClean="0"/>
-              <a:t>24.08.2024</a:t>
+              <a:t>25.08.2024</a:t>
             </a:fld>
             <a:endParaRPr lang="ru-RU"/>
           </a:p>
@@ -1610,7 +1610,7 @@
           <a:p>
             <a:fld id="{380BABED-8104-4418-89E4-07524A11A7A5}" type="datetimeFigureOut">
               <a:rPr lang="ru-RU" smtClean="0"/>
-              <a:t>24.08.2024</a:t>
+              <a:t>25.08.2024</a:t>
             </a:fld>
             <a:endParaRPr lang="ru-RU"/>
           </a:p>
@@ -1728,7 +1728,7 @@
           <a:p>
             <a:fld id="{380BABED-8104-4418-89E4-07524A11A7A5}" type="datetimeFigureOut">
               <a:rPr lang="ru-RU" smtClean="0"/>
-              <a:t>24.08.2024</a:t>
+              <a:t>25.08.2024</a:t>
             </a:fld>
             <a:endParaRPr lang="ru-RU"/>
           </a:p>
@@ -1823,7 +1823,7 @@
           <a:p>
             <a:fld id="{380BABED-8104-4418-89E4-07524A11A7A5}" type="datetimeFigureOut">
               <a:rPr lang="ru-RU" smtClean="0"/>
-              <a:t>24.08.2024</a:t>
+              <a:t>25.08.2024</a:t>
             </a:fld>
             <a:endParaRPr lang="ru-RU"/>
           </a:p>
@@ -2100,7 +2100,7 @@
           <a:p>
             <a:fld id="{380BABED-8104-4418-89E4-07524A11A7A5}" type="datetimeFigureOut">
               <a:rPr lang="ru-RU" smtClean="0"/>
-              <a:t>24.08.2024</a:t>
+              <a:t>25.08.2024</a:t>
             </a:fld>
             <a:endParaRPr lang="ru-RU"/>
           </a:p>
@@ -2353,7 +2353,7 @@
           <a:p>
             <a:fld id="{380BABED-8104-4418-89E4-07524A11A7A5}" type="datetimeFigureOut">
               <a:rPr lang="ru-RU" smtClean="0"/>
-              <a:t>24.08.2024</a:t>
+              <a:t>25.08.2024</a:t>
             </a:fld>
             <a:endParaRPr lang="ru-RU"/>
           </a:p>
@@ -2566,7 +2566,7 @@
           <a:p>
             <a:fld id="{380BABED-8104-4418-89E4-07524A11A7A5}" type="datetimeFigureOut">
               <a:rPr lang="ru-RU" smtClean="0"/>
-              <a:t>24.08.2024</a:t>
+              <a:t>25.08.2024</a:t>
             </a:fld>
             <a:endParaRPr lang="ru-RU"/>
           </a:p>
@@ -3107,11 +3107,7 @@
           <a:p>
             <a:r>
               <a:rPr lang="ru-RU" sz="2000" dirty="0" smtClean="0"/>
-              <a:t>Качество модели должно быть выше 90% для </a:t>
-            </a:r>
-            <a:r>
-              <a:rPr lang="ru-RU" sz="2000" dirty="0" smtClean="0"/>
-              <a:t>того чтобы </a:t>
+              <a:t>Качество модели должно быть выше 90% для того чтобы </a:t>
             </a:r>
             <a:r>
               <a:rPr lang="ru-RU" sz="2000" dirty="0" smtClean="0">
@@ -3255,18 +3251,18 @@
               <a:buAutoNum type="arabicPeriod"/>
             </a:pPr>
             <a:r>
-              <a:rPr lang="ru-RU" dirty="0" smtClean="0"/>
+              <a:rPr lang="ru-RU" strike="sngStrike" dirty="0" smtClean="0"/>
               <a:t>CI/CD конвейер – создание </a:t>
             </a:r>
             <a:r>
-              <a:rPr lang="ru-RU" dirty="0" err="1" smtClean="0"/>
+              <a:rPr lang="ru-RU" strike="sngStrike" dirty="0" err="1" smtClean="0"/>
               <a:t>docker</a:t>
             </a:r>
             <a:r>
-              <a:rPr lang="ru-RU" dirty="0" smtClean="0"/>
+              <a:rPr lang="ru-RU" strike="sngStrike" dirty="0" smtClean="0"/>
               <a:t> образа из лучшей модели. </a:t>
             </a:r>
-            <a:endParaRPr lang="en-US" dirty="0"/>
+            <a:endParaRPr lang="en-US" strike="sngStrike" dirty="0"/>
           </a:p>
           <a:p>
             <a:pPr marL="342900" indent="-342900">
@@ -3274,14 +3270,14 @@
               <a:buAutoNum type="arabicPeriod"/>
             </a:pPr>
             <a:r>
-              <a:rPr lang="ru-RU" dirty="0" err="1" smtClean="0"/>
+              <a:rPr lang="ru-RU" strike="sngStrike" dirty="0" err="1" smtClean="0"/>
               <a:t>Деплой</a:t>
             </a:r>
             <a:r>
-              <a:rPr lang="ru-RU" dirty="0" smtClean="0"/>
+              <a:rPr lang="ru-RU" strike="sngStrike" dirty="0" smtClean="0"/>
               <a:t> модели в k8s. Масштабирование под нагрузку.</a:t>
             </a:r>
-            <a:endParaRPr lang="en-US" dirty="0" smtClean="0"/>
+            <a:endParaRPr lang="en-US" strike="sngStrike" dirty="0" smtClean="0"/>
           </a:p>
           <a:p>
             <a:pPr marL="342900" indent="-342900">
@@ -3299,10 +3295,10 @@
               <a:buAutoNum type="arabicPeriod"/>
             </a:pPr>
             <a:r>
-              <a:rPr lang="ru-RU" dirty="0" smtClean="0"/>
+              <a:rPr lang="ru-RU" strike="sngStrike" dirty="0" smtClean="0"/>
               <a:t>Мониторинг метрик и нагрузки и оповещение. </a:t>
             </a:r>
-            <a:endParaRPr lang="ru-RU" dirty="0"/>
+            <a:endParaRPr lang="ru-RU" strike="sngStrike" dirty="0"/>
           </a:p>
         </p:txBody>
       </p:sp>

</xml_diff>